<commit_message>
changed the presentaiton slightly
</commit_message>
<xml_diff>
--- a/midterm/Relative_Attributes_v1.pptx
+++ b/midterm/Relative_Attributes_v1.pptx
@@ -310,7 +310,7 @@
           <a:p>
             <a:fld id="{71E6F03A-CE35-4A9D-B5FF-FFED13DAFE90}" type="datetimeFigureOut">
               <a:rPr lang="en-US" smtClean="0"/>
-              <a:t>3/13/2013</a:t>
+              <a:t>3/13/13</a:t>
             </a:fld>
             <a:endParaRPr lang="en-US"/>
           </a:p>
@@ -663,7 +663,7 @@
           <a:p>
             <a:fld id="{71E6F03A-CE35-4A9D-B5FF-FFED13DAFE90}" type="datetimeFigureOut">
               <a:rPr lang="en-US" smtClean="0"/>
-              <a:t>3/13/2013</a:t>
+              <a:t>3/13/13</a:t>
             </a:fld>
             <a:endParaRPr lang="en-US"/>
           </a:p>
@@ -838,7 +838,7 @@
           <a:p>
             <a:fld id="{71E6F03A-CE35-4A9D-B5FF-FFED13DAFE90}" type="datetimeFigureOut">
               <a:rPr lang="en-US" smtClean="0"/>
-              <a:t>3/13/2013</a:t>
+              <a:t>3/13/13</a:t>
             </a:fld>
             <a:endParaRPr lang="en-US"/>
           </a:p>
@@ -951,7 +951,7 @@
           <a:p>
             <a:fld id="{71E6F03A-CE35-4A9D-B5FF-FFED13DAFE90}" type="datetimeFigureOut">
               <a:rPr lang="en-US" smtClean="0"/>
-              <a:t>3/13/2013</a:t>
+              <a:t>3/13/13</a:t>
             </a:fld>
             <a:endParaRPr lang="en-US"/>
           </a:p>
@@ -1309,7 +1309,7 @@
           <a:p>
             <a:fld id="{71E6F03A-CE35-4A9D-B5FF-FFED13DAFE90}" type="datetimeFigureOut">
               <a:rPr lang="en-US" smtClean="0"/>
-              <a:t>3/13/2013</a:t>
+              <a:t>3/13/13</a:t>
             </a:fld>
             <a:endParaRPr lang="en-US"/>
           </a:p>
@@ -1574,7 +1574,7 @@
           <a:p>
             <a:fld id="{71E6F03A-CE35-4A9D-B5FF-FFED13DAFE90}" type="datetimeFigureOut">
               <a:rPr lang="en-US" smtClean="0"/>
-              <a:t>3/13/2013</a:t>
+              <a:t>3/13/13</a:t>
             </a:fld>
             <a:endParaRPr lang="en-US"/>
           </a:p>
@@ -1936,7 +1936,7 @@
           <a:p>
             <a:fld id="{71E6F03A-CE35-4A9D-B5FF-FFED13DAFE90}" type="datetimeFigureOut">
               <a:rPr lang="en-US" smtClean="0"/>
-              <a:t>3/13/2013</a:t>
+              <a:t>3/13/13</a:t>
             </a:fld>
             <a:endParaRPr lang="en-US"/>
           </a:p>
@@ -2163,7 +2163,7 @@
           <a:p>
             <a:fld id="{71E6F03A-CE35-4A9D-B5FF-FFED13DAFE90}" type="datetimeFigureOut">
               <a:rPr lang="en-US" smtClean="0"/>
-              <a:t>3/13/2013</a:t>
+              <a:t>3/13/13</a:t>
             </a:fld>
             <a:endParaRPr lang="en-US"/>
           </a:p>
@@ -2253,7 +2253,7 @@
           <a:p>
             <a:fld id="{71E6F03A-CE35-4A9D-B5FF-FFED13DAFE90}" type="datetimeFigureOut">
               <a:rPr lang="en-US" smtClean="0"/>
-              <a:t>3/13/2013</a:t>
+              <a:t>3/13/13</a:t>
             </a:fld>
             <a:endParaRPr lang="en-US"/>
           </a:p>
@@ -2520,7 +2520,7 @@
           <a:p>
             <a:fld id="{71E6F03A-CE35-4A9D-B5FF-FFED13DAFE90}" type="datetimeFigureOut">
               <a:rPr lang="en-US" smtClean="0"/>
-              <a:t>3/13/2013</a:t>
+              <a:t>3/13/13</a:t>
             </a:fld>
             <a:endParaRPr lang="en-US"/>
           </a:p>
@@ -2748,7 +2748,7 @@
           <a:p>
             <a:fld id="{71E6F03A-CE35-4A9D-B5FF-FFED13DAFE90}" type="datetimeFigureOut">
               <a:rPr lang="en-US" smtClean="0"/>
-              <a:t>3/13/2013</a:t>
+              <a:t>3/13/13</a:t>
             </a:fld>
             <a:endParaRPr lang="en-US"/>
           </a:p>
@@ -3247,7 +3247,7 @@
           <a:p>
             <a:fld id="{71E6F03A-CE35-4A9D-B5FF-FFED13DAFE90}" type="datetimeFigureOut">
               <a:rPr lang="en-US" smtClean="0"/>
-              <a:t>3/13/2013</a:t>
+              <a:t>3/13/13</a:t>
             </a:fld>
             <a:endParaRPr lang="en-US"/>
           </a:p>
@@ -3730,6 +3730,13 @@
   <p:clrMapOvr>
     <a:masterClrMapping/>
   </p:clrMapOvr>
+  <p:timing>
+    <p:tnLst>
+      <p:par>
+        <p:cTn xmlns:p14="http://schemas.microsoft.com/office/powerpoint/2010/main" id="1" dur="indefinite" restart="never" nodeType="tmRoot"/>
+      </p:par>
+    </p:tnLst>
+  </p:timing>
 </p:sld>
 </file>
 
@@ -3946,6 +3953,13 @@
   <p:clrMapOvr>
     <a:masterClrMapping/>
   </p:clrMapOvr>
+  <p:timing>
+    <p:tnLst>
+      <p:par>
+        <p:cTn xmlns:p14="http://schemas.microsoft.com/office/powerpoint/2010/main" id="1" dur="indefinite" restart="never" nodeType="tmRoot"/>
+      </p:par>
+    </p:tnLst>
+  </p:timing>
 </p:sld>
 </file>
 
@@ -4093,6 +4107,13 @@
   <p:clrMapOvr>
     <a:masterClrMapping/>
   </p:clrMapOvr>
+  <p:timing>
+    <p:tnLst>
+      <p:par>
+        <p:cTn xmlns:p14="http://schemas.microsoft.com/office/powerpoint/2010/main" id="1" dur="indefinite" restart="never" nodeType="tmRoot"/>
+      </p:par>
+    </p:tnLst>
+  </p:timing>
 </p:sld>
 </file>
 
@@ -4170,6 +4191,13 @@
   <p:clrMapOvr>
     <a:masterClrMapping/>
   </p:clrMapOvr>
+  <p:timing>
+    <p:tnLst>
+      <p:par>
+        <p:cTn xmlns:p14="http://schemas.microsoft.com/office/powerpoint/2010/main" id="1" dur="indefinite" restart="never" nodeType="tmRoot"/>
+      </p:par>
+    </p:tnLst>
+  </p:timing>
 </p:sld>
 </file>
 
@@ -4246,7 +4274,19 @@
             </a:pPr>
             <a:r>
               <a:rPr lang="en-US" dirty="0" smtClean="0"/>
-              <a:t>Automatically randomly choose category pairings</a:t>
+              <a:t>Automatically </a:t>
+            </a:r>
+            <a:r>
+              <a:rPr lang="en-US" dirty="0" smtClean="0"/>
+              <a:t>choose random</a:t>
+            </a:r>
+            <a:r>
+              <a:rPr lang="en-US" dirty="0" smtClean="0"/>
+              <a:t> </a:t>
+            </a:r>
+            <a:r>
+              <a:rPr lang="en-US" dirty="0" smtClean="0"/>
+              <a:t>category pairings</a:t>
             </a:r>
           </a:p>
           <a:p>
@@ -4369,6 +4409,13 @@
   <p:clrMapOvr>
     <a:masterClrMapping/>
   </p:clrMapOvr>
+  <p:timing>
+    <p:tnLst>
+      <p:par>
+        <p:cTn xmlns:p14="http://schemas.microsoft.com/office/powerpoint/2010/main" id="1" dur="indefinite" restart="never" nodeType="tmRoot"/>
+      </p:par>
+    </p:tnLst>
+  </p:timing>
 </p:sld>
 </file>
 
@@ -4482,6 +4529,13 @@
   <p:clrMapOvr>
     <a:masterClrMapping/>
   </p:clrMapOvr>
+  <p:timing>
+    <p:tnLst>
+      <p:par>
+        <p:cTn xmlns:p14="http://schemas.microsoft.com/office/powerpoint/2010/main" id="1" dur="indefinite" restart="never" nodeType="tmRoot"/>
+      </p:par>
+    </p:tnLst>
+  </p:timing>
 </p:sld>
 </file>
 
@@ -4595,6 +4649,13 @@
   <p:clrMapOvr>
     <a:masterClrMapping/>
   </p:clrMapOvr>
+  <p:timing>
+    <p:tnLst>
+      <p:par>
+        <p:cTn xmlns:p14="http://schemas.microsoft.com/office/powerpoint/2010/main" id="1" dur="indefinite" restart="never" nodeType="tmRoot"/>
+      </p:par>
+    </p:tnLst>
+  </p:timing>
 </p:sld>
 </file>
 
@@ -4899,7 +4960,7 @@
           </a:prstGeom>
           <a:noFill/>
           <a:extLst>
-            <a:ext uri="{909E8E84-426E-40DD-AFC4-6F175D3DCCD1}">
+            <a:ext uri="{909E8E84-426E-40dd-AFC4-6F175D3DCCD1}">
               <a14:hiddenFill xmlns:a14="http://schemas.microsoft.com/office/drawing/2010/main">
                 <a:solidFill>
                   <a:srgbClr val="FFFFFF"/>
@@ -4940,7 +5001,7 @@
           </a:prstGeom>
           <a:noFill/>
           <a:extLst>
-            <a:ext uri="{909E8E84-426E-40DD-AFC4-6F175D3DCCD1}">
+            <a:ext uri="{909E8E84-426E-40dd-AFC4-6F175D3DCCD1}">
               <a14:hiddenFill xmlns:a14="http://schemas.microsoft.com/office/drawing/2010/main">
                 <a:solidFill>
                   <a:srgbClr val="FFFFFF"/>
@@ -4981,7 +5042,7 @@
           </a:prstGeom>
           <a:noFill/>
           <a:extLst>
-            <a:ext uri="{909E8E84-426E-40DD-AFC4-6F175D3DCCD1}">
+            <a:ext uri="{909E8E84-426E-40dd-AFC4-6F175D3DCCD1}">
               <a14:hiddenFill xmlns:a14="http://schemas.microsoft.com/office/drawing/2010/main">
                 <a:solidFill>
                   <a:srgbClr val="FFFFFF"/>

</xml_diff>